<commit_message>
update release dates and add test playground links
</commit_message>
<xml_diff>
--- a/website/docs/extensions/UNTP-Diagrams-ExtensionsRegister.pptx
+++ b/website/docs/extensions/UNTP-Diagrams-ExtensionsRegister.pptx
@@ -5,12 +5,13 @@
     <p:sldMasterId id="2147483680" r:id="rId1"/>
   </p:sldMasterIdLst>
   <p:notesMasterIdLst>
-    <p:notesMasterId r:id="rId5"/>
+    <p:notesMasterId r:id="rId6"/>
   </p:notesMasterIdLst>
   <p:sldIdLst>
     <p:sldId id="410" r:id="rId2"/>
     <p:sldId id="404" r:id="rId3"/>
-    <p:sldId id="302" r:id="rId4"/>
+    <p:sldId id="411" r:id="rId4"/>
+    <p:sldId id="302" r:id="rId5"/>
   </p:sldIdLst>
   <p:sldSz cx="12192000" cy="6858000"/>
   <p:notesSz cx="6858000" cy="9144000"/>
@@ -116,6 +117,7 @@
           <p14:sldIdLst>
             <p14:sldId id="410"/>
             <p14:sldId id="404"/>
+            <p14:sldId id="411"/>
             <p14:sldId id="302"/>
           </p14:sldIdLst>
         </p14:section>
@@ -228,7 +230,7 @@
           <a:p>
             <a:fld id="{147FDE8E-C9EA-4A43-8789-DFF19C510078}" type="datetimeFigureOut">
               <a:rPr lang="en-US" smtClean="0"/>
-              <a:t>1/29/25</a:t>
+              <a:t>2/28/25</a:t>
             </a:fld>
             <a:endParaRPr lang="en-US"/>
           </a:p>
@@ -982,6 +984,322 @@
         <p:cNvPr id="1" name="">
           <a:extLst>
             <a:ext uri="{FF2B5EF4-FFF2-40B4-BE49-F238E27FC236}">
+              <a16:creationId xmlns:a16="http://schemas.microsoft.com/office/drawing/2014/main" id="{F8B26489-18D3-1401-53F2-88A53FDECAB6}"/>
+            </a:ext>
+          </a:extLst>
+        </p:cNvPr>
+        <p:cNvGrpSpPr/>
+        <p:nvPr/>
+      </p:nvGrpSpPr>
+      <p:grpSpPr>
+        <a:xfrm>
+          <a:off x="0" y="0"/>
+          <a:ext cx="0" cy="0"/>
+          <a:chOff x="0" y="0"/>
+          <a:chExt cx="0" cy="0"/>
+        </a:xfrm>
+      </p:grpSpPr>
+      <p:sp>
+        <p:nvSpPr>
+          <p:cNvPr id="2" name="Slide Image Placeholder 1">
+            <a:extLst>
+              <a:ext uri="{FF2B5EF4-FFF2-40B4-BE49-F238E27FC236}">
+                <a16:creationId xmlns:a16="http://schemas.microsoft.com/office/drawing/2014/main" id="{2EBC2D84-6DB5-B5A3-EE0B-FDC55033FB7F}"/>
+              </a:ext>
+            </a:extLst>
+          </p:cNvPr>
+          <p:cNvSpPr>
+            <a:spLocks noGrp="1" noRot="1" noChangeAspect="1"/>
+          </p:cNvSpPr>
+          <p:nvPr>
+            <p:ph type="sldImg"/>
+          </p:nvPr>
+        </p:nvSpPr>
+        <p:spPr>
+          <a:xfrm>
+            <a:off x="685800" y="1143000"/>
+            <a:ext cx="5486400" cy="3086100"/>
+          </a:xfrm>
+        </p:spPr>
+      </p:sp>
+      <p:sp>
+        <p:nvSpPr>
+          <p:cNvPr id="3" name="Notes Placeholder 2">
+            <a:extLst>
+              <a:ext uri="{FF2B5EF4-FFF2-40B4-BE49-F238E27FC236}">
+                <a16:creationId xmlns:a16="http://schemas.microsoft.com/office/drawing/2014/main" id="{4A07039F-8FB7-690E-F52E-76918A5B6CE5}"/>
+              </a:ext>
+            </a:extLst>
+          </p:cNvPr>
+          <p:cNvSpPr>
+            <a:spLocks noGrp="1"/>
+          </p:cNvSpPr>
+          <p:nvPr>
+            <p:ph type="body" idx="1"/>
+          </p:nvPr>
+        </p:nvSpPr>
+        <p:spPr/>
+        <p:txBody>
+          <a:bodyPr/>
+          <a:lstStyle/>
+          <a:p>
+            <a:pPr marL="0" marR="0" lvl="0" indent="0" algn="l" defTabSz="914400" rtl="0" eaLnBrk="1" fontAlgn="auto" latinLnBrk="0" hangingPunct="1">
+              <a:lnSpc>
+                <a:spcPct val="100000"/>
+              </a:lnSpc>
+              <a:spcBef>
+                <a:spcPts val="0"/>
+              </a:spcBef>
+              <a:spcAft>
+                <a:spcPts val="0"/>
+              </a:spcAft>
+              <a:buClrTx/>
+              <a:buSzTx/>
+              <a:buFontTx/>
+              <a:buNone/>
+              <a:tabLst/>
+              <a:defRPr/>
+            </a:pPr>
+            <a:r>
+              <a:rPr kumimoji="0" lang="en-AU" sz="1200" b="1" i="0" u="none" strike="noStrike" kern="1200" cap="none" spc="0" normalizeH="0" baseline="0" noProof="0" dirty="0">
+                <a:ln>
+                  <a:noFill/>
+                </a:ln>
+                <a:solidFill>
+                  <a:srgbClr val="4472C4">
+                    <a:lumMod val="50000"/>
+                  </a:srgbClr>
+                </a:solidFill>
+                <a:effectLst/>
+                <a:uLnTx/>
+                <a:uFillTx/>
+                <a:latin typeface="Calibri" panose="020F0502020204030204"/>
+                <a:ea typeface="+mn-ea"/>
+                <a:cs typeface="+mn-cs"/>
+              </a:rPr>
+              <a:t>Every industry needs supply from other sectors</a:t>
+            </a:r>
+          </a:p>
+          <a:p>
+            <a:pPr marL="0" marR="0" lvl="0" indent="0" algn="l" defTabSz="914400" rtl="0" eaLnBrk="1" fontAlgn="auto" latinLnBrk="0" hangingPunct="1">
+              <a:lnSpc>
+                <a:spcPct val="100000"/>
+              </a:lnSpc>
+              <a:spcBef>
+                <a:spcPts val="0"/>
+              </a:spcBef>
+              <a:spcAft>
+                <a:spcPts val="0"/>
+              </a:spcAft>
+              <a:buClrTx/>
+              <a:buSzTx/>
+              <a:buFontTx/>
+              <a:buNone/>
+              <a:tabLst/>
+              <a:defRPr/>
+            </a:pPr>
+            <a:r>
+              <a:rPr kumimoji="0" lang="en-AU" sz="1200" b="0" i="0" u="none" strike="noStrike" kern="1200" cap="none" spc="0" normalizeH="0" baseline="0" noProof="0" dirty="0">
+                <a:ln>
+                  <a:noFill/>
+                </a:ln>
+                <a:solidFill>
+                  <a:prstClr val="black"/>
+                </a:solidFill>
+                <a:effectLst/>
+                <a:uLnTx/>
+                <a:uFillTx/>
+                <a:latin typeface="Calibri" panose="020F0502020204030204"/>
+                <a:ea typeface="+mn-ea"/>
+                <a:cs typeface="+mn-cs"/>
+              </a:rPr>
+              <a:t>UNTP provides a cross-industry re-usable “core”.  Industry can create non-breaking extensions that suit their needs whilst maintaining </a:t>
+            </a:r>
+            <a:r>
+              <a:rPr kumimoji="0" lang="en-AU" sz="1200" b="1" i="0" u="sng" strike="noStrike" kern="1200" cap="none" spc="0" normalizeH="0" baseline="0" noProof="0" dirty="0">
+                <a:ln>
+                  <a:noFill/>
+                </a:ln>
+                <a:solidFill>
+                  <a:prstClr val="black"/>
+                </a:solidFill>
+                <a:effectLst/>
+                <a:uLnTx/>
+                <a:uFillTx/>
+                <a:latin typeface="Calibri" panose="020F0502020204030204"/>
+                <a:ea typeface="+mn-ea"/>
+                <a:cs typeface="+mn-cs"/>
+              </a:rPr>
+              <a:t>cross-industry interoperability</a:t>
+            </a:r>
+            <a:r>
+              <a:rPr kumimoji="0" lang="en-AU" sz="1200" b="0" i="0" u="none" strike="noStrike" kern="1200" cap="none" spc="0" normalizeH="0" baseline="0" noProof="0" dirty="0">
+                <a:ln>
+                  <a:noFill/>
+                </a:ln>
+                <a:solidFill>
+                  <a:prstClr val="black"/>
+                </a:solidFill>
+                <a:effectLst/>
+                <a:uLnTx/>
+                <a:uFillTx/>
+                <a:latin typeface="Calibri" panose="020F0502020204030204"/>
+                <a:ea typeface="+mn-ea"/>
+                <a:cs typeface="+mn-cs"/>
+              </a:rPr>
+              <a:t>.  </a:t>
+            </a:r>
+          </a:p>
+          <a:p>
+            <a:pPr marL="0" marR="0" lvl="0" indent="0" algn="l" defTabSz="914400" rtl="0" eaLnBrk="1" fontAlgn="auto" latinLnBrk="0" hangingPunct="1">
+              <a:lnSpc>
+                <a:spcPct val="100000"/>
+              </a:lnSpc>
+              <a:spcBef>
+                <a:spcPts val="0"/>
+              </a:spcBef>
+              <a:spcAft>
+                <a:spcPts val="0"/>
+              </a:spcAft>
+              <a:buClrTx/>
+              <a:buSzTx/>
+              <a:buFontTx/>
+              <a:buNone/>
+              <a:tabLst/>
+              <a:defRPr/>
+            </a:pPr>
+            <a:endParaRPr kumimoji="0" lang="en-AU" sz="1200" b="1" i="0" u="none" strike="noStrike" kern="1200" cap="none" spc="0" normalizeH="0" baseline="0" noProof="0" dirty="0">
+              <a:ln>
+                <a:noFill/>
+              </a:ln>
+              <a:solidFill>
+                <a:srgbClr val="4472C4">
+                  <a:lumMod val="50000"/>
+                </a:srgbClr>
+              </a:solidFill>
+              <a:effectLst/>
+              <a:uLnTx/>
+              <a:uFillTx/>
+              <a:latin typeface="Calibri" panose="020F0502020204030204"/>
+              <a:ea typeface="+mn-ea"/>
+              <a:cs typeface="+mn-cs"/>
+            </a:endParaRPr>
+          </a:p>
+          <a:p>
+            <a:endParaRPr lang="en-AU" dirty="0"/>
+          </a:p>
+        </p:txBody>
+      </p:sp>
+      <p:sp>
+        <p:nvSpPr>
+          <p:cNvPr id="4" name="Slide Number Placeholder 3">
+            <a:extLst>
+              <a:ext uri="{FF2B5EF4-FFF2-40B4-BE49-F238E27FC236}">
+                <a16:creationId xmlns:a16="http://schemas.microsoft.com/office/drawing/2014/main" id="{8895F48A-0C2B-F500-CDA3-5CEA4163674D}"/>
+              </a:ext>
+            </a:extLst>
+          </p:cNvPr>
+          <p:cNvSpPr>
+            <a:spLocks noGrp="1"/>
+          </p:cNvSpPr>
+          <p:nvPr>
+            <p:ph type="sldNum" sz="quarter" idx="5"/>
+          </p:nvPr>
+        </p:nvSpPr>
+        <p:spPr/>
+        <p:txBody>
+          <a:bodyPr/>
+          <a:lstStyle/>
+          <a:p>
+            <a:pPr marL="0" marR="0" lvl="0" indent="0" algn="r" defTabSz="457200" rtl="0" eaLnBrk="1" fontAlgn="auto" latinLnBrk="0" hangingPunct="1">
+              <a:lnSpc>
+                <a:spcPct val="100000"/>
+              </a:lnSpc>
+              <a:spcBef>
+                <a:spcPts val="0"/>
+              </a:spcBef>
+              <a:spcAft>
+                <a:spcPts val="0"/>
+              </a:spcAft>
+              <a:buClrTx/>
+              <a:buSzTx/>
+              <a:buFontTx/>
+              <a:buNone/>
+              <a:tabLst/>
+              <a:defRPr/>
+            </a:pPr>
+            <a:fld id="{89734552-1ECE-3F4E-885C-0196F83BD32B}" type="slidenum">
+              <a:rPr kumimoji="0" lang="en-AU" sz="1200" b="0" i="0" u="none" strike="noStrike" kern="1200" cap="none" spc="0" normalizeH="0" baseline="0" noProof="0" smtClean="0">
+                <a:ln>
+                  <a:noFill/>
+                </a:ln>
+                <a:solidFill>
+                  <a:prstClr val="black"/>
+                </a:solidFill>
+                <a:effectLst/>
+                <a:uLnTx/>
+                <a:uFillTx/>
+                <a:latin typeface="Calibri" panose="020F0502020204030204"/>
+                <a:ea typeface="+mn-ea"/>
+                <a:cs typeface="+mn-cs"/>
+              </a:rPr>
+              <a:pPr marL="0" marR="0" lvl="0" indent="0" algn="r" defTabSz="457200" rtl="0" eaLnBrk="1" fontAlgn="auto" latinLnBrk="0" hangingPunct="1">
+                <a:lnSpc>
+                  <a:spcPct val="100000"/>
+                </a:lnSpc>
+                <a:spcBef>
+                  <a:spcPts val="0"/>
+                </a:spcBef>
+                <a:spcAft>
+                  <a:spcPts val="0"/>
+                </a:spcAft>
+                <a:buClrTx/>
+                <a:buSzTx/>
+                <a:buFontTx/>
+                <a:buNone/>
+                <a:tabLst/>
+                <a:defRPr/>
+              </a:pPr>
+              <a:t>3</a:t>
+            </a:fld>
+            <a:endParaRPr kumimoji="0" lang="en-AU" sz="1200" b="0" i="0" u="none" strike="noStrike" kern="1200" cap="none" spc="0" normalizeH="0" baseline="0" noProof="0">
+              <a:ln>
+                <a:noFill/>
+              </a:ln>
+              <a:solidFill>
+                <a:prstClr val="black"/>
+              </a:solidFill>
+              <a:effectLst/>
+              <a:uLnTx/>
+              <a:uFillTx/>
+              <a:latin typeface="Calibri" panose="020F0502020204030204"/>
+              <a:ea typeface="+mn-ea"/>
+              <a:cs typeface="+mn-cs"/>
+            </a:endParaRPr>
+          </a:p>
+        </p:txBody>
+      </p:sp>
+    </p:spTree>
+    <p:extLst>
+      <p:ext uri="{BB962C8B-B14F-4D97-AF65-F5344CB8AC3E}">
+        <p14:creationId xmlns:p14="http://schemas.microsoft.com/office/powerpoint/2010/main" val="3675319764"/>
+      </p:ext>
+    </p:extLst>
+  </p:cSld>
+  <p:clrMapOvr>
+    <a:masterClrMapping/>
+  </p:clrMapOvr>
+</p:notes>
+</file>
+
+<file path=ppt/notesSlides/notesSlide4.xml><?xml version="1.0" encoding="utf-8"?>
+<p:notes xmlns:a="http://schemas.openxmlformats.org/drawingml/2006/main" xmlns:r="http://schemas.openxmlformats.org/officeDocument/2006/relationships" xmlns:p="http://schemas.openxmlformats.org/presentationml/2006/main">
+  <p:cSld>
+    <p:spTree>
+      <p:nvGrpSpPr>
+        <p:cNvPr id="1" name="">
+          <a:extLst>
+            <a:ext uri="{FF2B5EF4-FFF2-40B4-BE49-F238E27FC236}">
               <a16:creationId xmlns:a16="http://schemas.microsoft.com/office/drawing/2014/main" id="{7ABFAF1E-E9EE-2E19-FCA8-C6A7A6B68D6B}"/>
             </a:ext>
           </a:extLst>
@@ -1100,7 +1418,7 @@
           <a:p>
             <a:fld id="{89734552-1ECE-3F4E-885C-0196F83BD32B}" type="slidenum">
               <a:rPr lang="en-AU" smtClean="0"/>
-              <a:t>3</a:t>
+              <a:t>4</a:t>
             </a:fld>
             <a:endParaRPr lang="en-AU"/>
           </a:p>
@@ -1250,7 +1568,7 @@
           <a:p>
             <a:fld id="{6DBF160B-3A44-4C3B-BCEA-BD19AB6803E9}" type="datetime1">
               <a:rPr lang="en-US" smtClean="0"/>
-              <a:t>1/29/25</a:t>
+              <a:t>2/28/25</a:t>
             </a:fld>
             <a:endParaRPr lang="en-US"/>
           </a:p>
@@ -1575,7 +1893,7 @@
           <a:p>
             <a:fld id="{C764DE79-268F-4C1A-8933-263129D2AF90}" type="datetimeFigureOut">
               <a:rPr lang="en-US" dirty="0"/>
-              <a:t>1/29/25</a:t>
+              <a:t>2/28/25</a:t>
             </a:fld>
             <a:endParaRPr lang="en-US" dirty="0"/>
           </a:p>
@@ -1756,7 +2074,7 @@
           <a:p>
             <a:fld id="{C764DE79-268F-4C1A-8933-263129D2AF90}" type="datetimeFigureOut">
               <a:rPr lang="en-US" dirty="0"/>
-              <a:t>1/29/25</a:t>
+              <a:t>2/28/25</a:t>
             </a:fld>
             <a:endParaRPr lang="en-US" dirty="0"/>
           </a:p>
@@ -2042,7 +2360,7 @@
           <a:p>
             <a:fld id="{9A38245A-2362-40A2-9432-11E173A2FE35}" type="datetime1">
               <a:rPr lang="en-US" smtClean="0"/>
-              <a:t>1/29/25</a:t>
+              <a:t>2/28/25</a:t>
             </a:fld>
             <a:endParaRPr lang="en-US"/>
           </a:p>
@@ -2351,7 +2669,7 @@
           <a:p>
             <a:fld id="{6FB96879-471E-46C8-A813-F70B84DA637C}" type="datetime1">
               <a:rPr lang="en-US" smtClean="0"/>
-              <a:t>1/29/25</a:t>
+              <a:t>2/28/25</a:t>
             </a:fld>
             <a:endParaRPr lang="en-US"/>
           </a:p>
@@ -2690,7 +3008,7 @@
           <a:p>
             <a:fld id="{81A389D0-0F06-4052-931B-BC5D7EEFC8E9}" type="datetime1">
               <a:rPr lang="en-US" smtClean="0"/>
-              <a:t>1/29/25</a:t>
+              <a:t>2/28/25</a:t>
             </a:fld>
             <a:endParaRPr lang="en-US"/>
           </a:p>
@@ -2914,7 +3232,7 @@
           <a:p>
             <a:fld id="{FA8505E0-37E7-4BCD-BA8D-3C81CE89C100}" type="datetime1">
               <a:rPr lang="en-US" smtClean="0"/>
-              <a:t>1/29/25</a:t>
+              <a:t>2/28/25</a:t>
             </a:fld>
             <a:endParaRPr lang="en-US"/>
           </a:p>
@@ -3161,7 +3479,7 @@
           <a:p>
             <a:fld id="{C764DE79-268F-4C1A-8933-263129D2AF90}" type="datetimeFigureOut">
               <a:rPr lang="en-US" dirty="0"/>
-              <a:t>1/29/25</a:t>
+              <a:t>2/28/25</a:t>
             </a:fld>
             <a:endParaRPr lang="en-US" dirty="0"/>
           </a:p>
@@ -3394,7 +3712,7 @@
           <a:p>
             <a:fld id="{9A38245A-2362-40A2-9432-11E173A2FE35}" type="datetime1">
               <a:rPr lang="en-US" smtClean="0"/>
-              <a:t>1/29/25</a:t>
+              <a:t>2/28/25</a:t>
             </a:fld>
             <a:endParaRPr lang="en-US"/>
           </a:p>
@@ -3761,7 +4079,7 @@
           <a:p>
             <a:fld id="{C764DE79-268F-4C1A-8933-263129D2AF90}" type="datetimeFigureOut">
               <a:rPr lang="en-US" dirty="0"/>
-              <a:t>1/29/25</a:t>
+              <a:t>2/28/25</a:t>
             </a:fld>
             <a:endParaRPr lang="en-US" dirty="0"/>
           </a:p>
@@ -3880,7 +4198,7 @@
           <a:p>
             <a:fld id="{81A389D0-0F06-4052-931B-BC5D7EEFC8E9}" type="datetime1">
               <a:rPr lang="en-US" smtClean="0"/>
-              <a:t>1/29/25</a:t>
+              <a:t>2/28/25</a:t>
             </a:fld>
             <a:endParaRPr lang="en-US"/>
           </a:p>
@@ -3975,7 +4293,7 @@
           <a:p>
             <a:fld id="{5ECBC4FA-4788-483E-AD3A-36A4714E3E4D}" type="datetime1">
               <a:rPr lang="en-US" smtClean="0"/>
-              <a:t>1/29/25</a:t>
+              <a:t>2/28/25</a:t>
             </a:fld>
             <a:endParaRPr lang="en-US"/>
           </a:p>
@@ -4252,7 +4570,7 @@
           <a:p>
             <a:fld id="{C764DE79-268F-4C1A-8933-263129D2AF90}" type="datetimeFigureOut">
               <a:rPr lang="en-US" dirty="0"/>
-              <a:t>1/29/25</a:t>
+              <a:t>2/28/25</a:t>
             </a:fld>
             <a:endParaRPr lang="en-US" dirty="0"/>
           </a:p>
@@ -4510,7 +4828,7 @@
           <a:p>
             <a:fld id="{C764DE79-268F-4C1A-8933-263129D2AF90}" type="datetimeFigureOut">
               <a:rPr lang="en-US" dirty="0"/>
-              <a:t>1/29/25</a:t>
+              <a:t>2/28/25</a:t>
             </a:fld>
             <a:endParaRPr lang="en-US" dirty="0"/>
           </a:p>
@@ -4724,7 +5042,7 @@
           <a:p>
             <a:fld id="{C764DE79-268F-4C1A-8933-263129D2AF90}" type="datetimeFigureOut">
               <a:rPr lang="en-US" dirty="0"/>
-              <a:t>1/29/25</a:t>
+              <a:t>2/28/25</a:t>
             </a:fld>
             <a:endParaRPr lang="en-US" dirty="0"/>
           </a:p>
@@ -8126,6 +8444,42 @@
 </file>
 
 <file path=ppt/slides/slide3.xml><?xml version="1.0" encoding="utf-8"?>
+<p:sld xmlns:a="http://schemas.openxmlformats.org/drawingml/2006/main" xmlns:r="http://schemas.openxmlformats.org/officeDocument/2006/relationships" xmlns:p="http://schemas.openxmlformats.org/presentationml/2006/main">
+  <p:cSld>
+    <p:spTree>
+      <p:nvGrpSpPr>
+        <p:cNvPr id="1" name="">
+          <a:extLst>
+            <a:ext uri="{FF2B5EF4-FFF2-40B4-BE49-F238E27FC236}">
+              <a16:creationId xmlns:a16="http://schemas.microsoft.com/office/drawing/2014/main" id="{9DD8A66E-86D7-D581-9CA2-C9E7B49CD228}"/>
+            </a:ext>
+          </a:extLst>
+        </p:cNvPr>
+        <p:cNvGrpSpPr/>
+        <p:nvPr/>
+      </p:nvGrpSpPr>
+      <p:grpSpPr>
+        <a:xfrm>
+          <a:off x="0" y="0"/>
+          <a:ext cx="0" cy="0"/>
+          <a:chOff x="0" y="0"/>
+          <a:chExt cx="0" cy="0"/>
+        </a:xfrm>
+      </p:grpSpPr>
+    </p:spTree>
+    <p:extLst>
+      <p:ext uri="{BB962C8B-B14F-4D97-AF65-F5344CB8AC3E}">
+        <p14:creationId xmlns:p14="http://schemas.microsoft.com/office/powerpoint/2010/main" val="2199184181"/>
+      </p:ext>
+    </p:extLst>
+  </p:cSld>
+  <p:clrMapOvr>
+    <a:masterClrMapping/>
+  </p:clrMapOvr>
+</p:sld>
+</file>
+
+<file path=ppt/slides/slide4.xml><?xml version="1.0" encoding="utf-8"?>
 <p:sld xmlns:a="http://schemas.openxmlformats.org/drawingml/2006/main" xmlns:r="http://schemas.openxmlformats.org/officeDocument/2006/relationships" xmlns:p="http://schemas.openxmlformats.org/presentationml/2006/main">
   <p:cSld>
     <p:spTree>

</xml_diff>